<commit_message>
Add Graphviz to yaml, minor changes
</commit_message>
<xml_diff>
--- a/really-simple-ml-net.pptx
+++ b/really-simple-ml-net.pptx
@@ -605,6 +605,31 @@
               <a:t>If you want to do the follow-along section</a:t>
             </a:r>
           </a:p>
+          <a:p>
+            <a:endParaRPr lang="en-US" dirty="0"/>
+          </a:p>
+          <a:p>
+            <a:r>
+              <a:rPr lang="en-US" dirty="0"/>
+              <a:t>When testing for all of this I bumped into this:</a:t>
+            </a:r>
+          </a:p>
+          <a:p>
+            <a:pPr marL="171450" indent="-171450">
+              <a:buFont typeface="Arial" panose="020B0604020202020204" pitchFamily="34" charset="0"/>
+              <a:buChar char="•"/>
+            </a:pPr>
+            <a:r>
+              <a:rPr lang="en-US" dirty="0">
+                <a:hlinkClick r:id="rId3"/>
+              </a:rPr>
+              <a:t>https://github.com/dotnet/try/issues/844</a:t>
+            </a:r>
+            <a:r>
+              <a:rPr lang="en-US" dirty="0"/>
+              <a:t> so please install 3.1.103</a:t>
+            </a:r>
+          </a:p>
         </p:txBody>
       </p:sp>
       <p:sp>
@@ -689,7 +714,7 @@
           <a:p>
             <a:r>
               <a:rPr lang="en-US" dirty="0"/>
-              <a:t>Free, no costs no money to use.</a:t>
+              <a:t>Free, costs no money to use.</a:t>
             </a:r>
           </a:p>
           <a:p>
@@ -4247,7 +4272,7 @@
           <a:p>
             <a:r>
               <a:rPr lang="en-US" b="1" dirty="0"/>
-              <a:t>Dead simple ML.NET for Scientists, Researchers and Engineers</a:t>
+              <a:t>Really simple ML.NET for Scientists, Researchers and Engineers</a:t>
             </a:r>
             <a:endParaRPr lang="en-US" dirty="0"/>
           </a:p>
@@ -4365,7 +4390,9 @@
           </a:xfrm>
         </p:spPr>
         <p:txBody>
-          <a:bodyPr/>
+          <a:bodyPr>
+            <a:normAutofit/>
+          </a:bodyPr>
           <a:lstStyle/>
           <a:p>
             <a:r>
@@ -4373,43 +4400,62 @@
               <a:t>Download and install.NET Core 3.1 SDK and 2.1 </a:t>
             </a:r>
             <a:r>
-              <a:rPr lang="en-US" dirty="0">
+              <a:rPr lang="en-US" strike="sngStrike" dirty="0">
                 <a:hlinkClick r:id="rId3"/>
               </a:rPr>
               <a:t>https://dotnet.microsoft.com/download</a:t>
             </a:r>
-            <a:endParaRPr lang="en-US" dirty="0"/>
-          </a:p>
-          <a:p>
+            <a:r>
+              <a:rPr lang="en-US" strike="sngStrike" dirty="0"/>
+              <a:t> </a:t>
+            </a:r>
             <a:r>
               <a:rPr lang="en-US" dirty="0"/>
-              <a:t>Download and install Anaconda </a:t>
-            </a:r>
+              <a:t>*</a:t>
+            </a:r>
+          </a:p>
+          <a:p>
             <a:r>
               <a:rPr lang="en-US" dirty="0">
                 <a:hlinkClick r:id="rId4"/>
               </a:rPr>
-              <a:t>https://www.anaconda.com/products/individual</a:t>
-            </a:r>
-            <a:endParaRPr lang="en-US" dirty="0"/>
-          </a:p>
-          <a:p>
+              <a:t>https://dotnet.microsoft.com/download/dotnet/current</a:t>
+            </a:r>
             <a:r>
               <a:rPr lang="en-US" dirty="0"/>
-              <a:t>(optional) Download and install </a:t>
-            </a:r>
-            <a:r>
-              <a:rPr lang="en-US" dirty="0" err="1"/>
-              <a:t>Graphviz</a:t>
-            </a:r>
+              <a:t>  SDK 3.1.103</a:t>
+            </a:r>
+          </a:p>
+          <a:p>
             <a:r>
               <a:rPr lang="en-US" dirty="0"/>
-              <a:t> </a:t>
+              <a:t>Download and install Anaconda </a:t>
             </a:r>
             <a:r>
               <a:rPr lang="en-US" dirty="0">
                 <a:hlinkClick r:id="rId5"/>
               </a:rPr>
+              <a:t>https://www.anaconda.com/products/individual</a:t>
+            </a:r>
+            <a:endParaRPr lang="en-US" dirty="0"/>
+          </a:p>
+          <a:p>
+            <a:r>
+              <a:rPr lang="en-US" dirty="0"/>
+              <a:t>(optional) Download and install </a:t>
+            </a:r>
+            <a:r>
+              <a:rPr lang="en-US" dirty="0" err="1"/>
+              <a:t>Graphviz</a:t>
+            </a:r>
+            <a:r>
+              <a:rPr lang="en-US" dirty="0"/>
+              <a:t> </a:t>
+            </a:r>
+            <a:r>
+              <a:rPr lang="en-US" dirty="0">
+                <a:hlinkClick r:id="rId6"/>
+              </a:rPr>
               <a:t>https://graphviz.gitlab.io/download/</a:t>
             </a:r>
             <a:endParaRPr lang="en-US" dirty="0"/>
@@ -4424,7 +4470,7 @@
             </a:br>
             <a:r>
               <a:rPr lang="en-US" dirty="0">
-                <a:hlinkClick r:id="rId6"/>
+                <a:hlinkClick r:id="rId7"/>
               </a:rPr>
               <a:t>https://git-scm.com/downloads</a:t>
             </a:r>

</xml_diff>

<commit_message>
Add safe checkpoint, before attempting to move over to dotnet-interactive
</commit_message>
<xml_diff>
--- a/really-simple-ml-net.pptx
+++ b/really-simple-ml-net.pptx
@@ -202,7 +202,7 @@
           <a:p>
             <a:fld id="{4B6A4A07-C180-4E5A-B172-79308A58FD04}" type="datetimeFigureOut">
               <a:rPr lang="en-US" smtClean="0"/>
-              <a:t>6/13/2020</a:t>
+              <a:t>6/20/2020</a:t>
             </a:fld>
             <a:endParaRPr lang="en-US"/>
           </a:p>
@@ -1180,7 +1180,7 @@
           <a:p>
             <a:fld id="{DFE30287-765A-4AB0-BB96-53FA911AEAD1}" type="datetimeFigureOut">
               <a:rPr lang="en-US" smtClean="0"/>
-              <a:t>6/13/2020</a:t>
+              <a:t>6/20/2020</a:t>
             </a:fld>
             <a:endParaRPr lang="en-US"/>
           </a:p>
@@ -1378,7 +1378,7 @@
           <a:p>
             <a:fld id="{DFE30287-765A-4AB0-BB96-53FA911AEAD1}" type="datetimeFigureOut">
               <a:rPr lang="en-US" smtClean="0"/>
-              <a:t>6/13/2020</a:t>
+              <a:t>6/20/2020</a:t>
             </a:fld>
             <a:endParaRPr lang="en-US"/>
           </a:p>
@@ -1586,7 +1586,7 @@
           <a:p>
             <a:fld id="{DFE30287-765A-4AB0-BB96-53FA911AEAD1}" type="datetimeFigureOut">
               <a:rPr lang="en-US" smtClean="0"/>
-              <a:t>6/13/2020</a:t>
+              <a:t>6/20/2020</a:t>
             </a:fld>
             <a:endParaRPr lang="en-US"/>
           </a:p>
@@ -1784,7 +1784,7 @@
           <a:p>
             <a:fld id="{DFE30287-765A-4AB0-BB96-53FA911AEAD1}" type="datetimeFigureOut">
               <a:rPr lang="en-US" smtClean="0"/>
-              <a:t>6/13/2020</a:t>
+              <a:t>6/20/2020</a:t>
             </a:fld>
             <a:endParaRPr lang="en-US"/>
           </a:p>
@@ -2059,7 +2059,7 @@
           <a:p>
             <a:fld id="{DFE30287-765A-4AB0-BB96-53FA911AEAD1}" type="datetimeFigureOut">
               <a:rPr lang="en-US" smtClean="0"/>
-              <a:t>6/13/2020</a:t>
+              <a:t>6/20/2020</a:t>
             </a:fld>
             <a:endParaRPr lang="en-US"/>
           </a:p>
@@ -2324,7 +2324,7 @@
           <a:p>
             <a:fld id="{DFE30287-765A-4AB0-BB96-53FA911AEAD1}" type="datetimeFigureOut">
               <a:rPr lang="en-US" smtClean="0"/>
-              <a:t>6/13/2020</a:t>
+              <a:t>6/20/2020</a:t>
             </a:fld>
             <a:endParaRPr lang="en-US"/>
           </a:p>
@@ -2736,7 +2736,7 @@
           <a:p>
             <a:fld id="{DFE30287-765A-4AB0-BB96-53FA911AEAD1}" type="datetimeFigureOut">
               <a:rPr lang="en-US" smtClean="0"/>
-              <a:t>6/13/2020</a:t>
+              <a:t>6/20/2020</a:t>
             </a:fld>
             <a:endParaRPr lang="en-US"/>
           </a:p>
@@ -2877,7 +2877,7 @@
           <a:p>
             <a:fld id="{DFE30287-765A-4AB0-BB96-53FA911AEAD1}" type="datetimeFigureOut">
               <a:rPr lang="en-US" smtClean="0"/>
-              <a:t>6/13/2020</a:t>
+              <a:t>6/20/2020</a:t>
             </a:fld>
             <a:endParaRPr lang="en-US"/>
           </a:p>
@@ -2990,7 +2990,7 @@
           <a:p>
             <a:fld id="{DFE30287-765A-4AB0-BB96-53FA911AEAD1}" type="datetimeFigureOut">
               <a:rPr lang="en-US" smtClean="0"/>
-              <a:t>6/13/2020</a:t>
+              <a:t>6/20/2020</a:t>
             </a:fld>
             <a:endParaRPr lang="en-US"/>
           </a:p>
@@ -3301,7 +3301,7 @@
           <a:p>
             <a:fld id="{DFE30287-765A-4AB0-BB96-53FA911AEAD1}" type="datetimeFigureOut">
               <a:rPr lang="en-US" smtClean="0"/>
-              <a:t>6/13/2020</a:t>
+              <a:t>6/20/2020</a:t>
             </a:fld>
             <a:endParaRPr lang="en-US"/>
           </a:p>
@@ -3589,7 +3589,7 @@
           <a:p>
             <a:fld id="{DFE30287-765A-4AB0-BB96-53FA911AEAD1}" type="datetimeFigureOut">
               <a:rPr lang="en-US" smtClean="0"/>
-              <a:t>6/13/2020</a:t>
+              <a:t>6/20/2020</a:t>
             </a:fld>
             <a:endParaRPr lang="en-US"/>
           </a:p>
@@ -3830,7 +3830,7 @@
           <a:p>
             <a:fld id="{DFE30287-765A-4AB0-BB96-53FA911AEAD1}" type="datetimeFigureOut">
               <a:rPr lang="en-US" smtClean="0"/>
-              <a:t>6/13/2020</a:t>
+              <a:t>6/20/2020</a:t>
             </a:fld>
             <a:endParaRPr lang="en-US"/>
           </a:p>
@@ -4397,84 +4397,34 @@
           <a:p>
             <a:r>
               <a:rPr lang="en-US" dirty="0"/>
-              <a:t>Download and install.NET Core 3.1 SDK and 2.1 </a:t>
-            </a:r>
-            <a:r>
-              <a:rPr lang="en-US" strike="sngStrike" dirty="0">
+              <a:t>Do the Setup Instructions from the GitHub: (Maybe you still have time) </a:t>
+            </a:r>
+            <a:r>
+              <a:rPr lang="en-US" dirty="0">
                 <a:hlinkClick r:id="rId3"/>
               </a:rPr>
-              <a:t>https://dotnet.microsoft.com/download</a:t>
-            </a:r>
-            <a:r>
-              <a:rPr lang="en-US" strike="sngStrike" dirty="0"/>
-              <a:t> </a:t>
-            </a:r>
+              <a:t>https://github.com/edirgarcia/ml_net_lab</a:t>
+            </a:r>
+            <a:endParaRPr lang="en-US" dirty="0"/>
+          </a:p>
+          <a:p>
+            <a:endParaRPr lang="en-US" dirty="0"/>
+          </a:p>
+          <a:p>
             <a:r>
               <a:rPr lang="en-US" dirty="0"/>
-              <a:t>*</a:t>
-            </a:r>
-          </a:p>
-          <a:p>
+              <a:t>Important Note: The C# Lab only works on SDK 3.1.103, there’s issues with newer versions, I have let them know: </a:t>
+            </a:r>
             <a:r>
               <a:rPr lang="en-US" dirty="0">
                 <a:hlinkClick r:id="rId4"/>
               </a:rPr>
-              <a:t>https://dotnet.microsoft.com/download/dotnet/current</a:t>
-            </a:r>
-            <a:r>
-              <a:rPr lang="en-US" dirty="0"/>
-              <a:t>  SDK 3.1.103</a:t>
-            </a:r>
-          </a:p>
-          <a:p>
-            <a:r>
-              <a:rPr lang="en-US" dirty="0"/>
-              <a:t>Download and install Anaconda </a:t>
-            </a:r>
-            <a:r>
-              <a:rPr lang="en-US" dirty="0">
-                <a:hlinkClick r:id="rId5"/>
-              </a:rPr>
-              <a:t>https://www.anaconda.com/products/individual</a:t>
-            </a:r>
-            <a:endParaRPr lang="en-US" dirty="0"/>
-          </a:p>
-          <a:p>
-            <a:r>
-              <a:rPr lang="en-US" dirty="0"/>
-              <a:t>(optional) Download and install </a:t>
-            </a:r>
-            <a:r>
-              <a:rPr lang="en-US" dirty="0" err="1"/>
-              <a:t>Graphviz</a:t>
+              <a:t>https://github.com/dotnet/try/issues/844</a:t>
             </a:r>
             <a:r>
               <a:rPr lang="en-US" dirty="0"/>
               <a:t> </a:t>
             </a:r>
-            <a:r>
-              <a:rPr lang="en-US" dirty="0">
-                <a:hlinkClick r:id="rId6"/>
-              </a:rPr>
-              <a:t>https://graphviz.gitlab.io/download/</a:t>
-            </a:r>
-            <a:endParaRPr lang="en-US" dirty="0"/>
-          </a:p>
-          <a:p>
-            <a:r>
-              <a:rPr lang="en-US" dirty="0"/>
-              <a:t>I assume you already have Git, if not: </a:t>
-            </a:r>
-            <a:br>
-              <a:rPr lang="en-US" dirty="0"/>
-            </a:br>
-            <a:r>
-              <a:rPr lang="en-US" dirty="0">
-                <a:hlinkClick r:id="rId7"/>
-              </a:rPr>
-              <a:t>https://git-scm.com/downloads</a:t>
-            </a:r>
-            <a:endParaRPr lang="en-US" dirty="0"/>
           </a:p>
         </p:txBody>
       </p:sp>

</xml_diff>

<commit_message>
Add comment to PPT
</commit_message>
<xml_diff>
--- a/really-simple-ml-net.pptx
+++ b/really-simple-ml-net.pptx
@@ -202,7 +202,7 @@
           <a:p>
             <a:fld id="{4B6A4A07-C180-4E5A-B172-79308A58FD04}" type="datetimeFigureOut">
               <a:rPr lang="en-US" smtClean="0"/>
-              <a:t>6/20/2020</a:t>
+              <a:t>6/25/2020</a:t>
             </a:fld>
             <a:endParaRPr lang="en-US"/>
           </a:p>
@@ -712,6 +712,18 @@
           <a:bodyPr/>
           <a:lstStyle/>
           <a:p>
+            <a:endParaRPr lang="en-US" dirty="0"/>
+          </a:p>
+          <a:p>
+            <a:r>
+              <a:rPr lang="en-US" dirty="0"/>
+              <a:t>Like TLC but external, most of our support is shifting to ML.NET</a:t>
+            </a:r>
+          </a:p>
+          <a:p>
+            <a:endParaRPr lang="en-US" dirty="0"/>
+          </a:p>
+          <a:p>
             <a:r>
               <a:rPr lang="en-US" dirty="0"/>
               <a:t>Free, costs no money to use.</a:t>
@@ -757,6 +769,9 @@
               <a:rPr lang="en-US" dirty="0" err="1"/>
               <a:t>AutoML</a:t>
             </a:r>
+            <a:endParaRPr lang="en-US" dirty="0"/>
+          </a:p>
+          <a:p>
             <a:endParaRPr lang="en-US" dirty="0"/>
           </a:p>
         </p:txBody>
@@ -1180,7 +1195,7 @@
           <a:p>
             <a:fld id="{DFE30287-765A-4AB0-BB96-53FA911AEAD1}" type="datetimeFigureOut">
               <a:rPr lang="en-US" smtClean="0"/>
-              <a:t>6/20/2020</a:t>
+              <a:t>6/25/2020</a:t>
             </a:fld>
             <a:endParaRPr lang="en-US"/>
           </a:p>
@@ -1378,7 +1393,7 @@
           <a:p>
             <a:fld id="{DFE30287-765A-4AB0-BB96-53FA911AEAD1}" type="datetimeFigureOut">
               <a:rPr lang="en-US" smtClean="0"/>
-              <a:t>6/20/2020</a:t>
+              <a:t>6/25/2020</a:t>
             </a:fld>
             <a:endParaRPr lang="en-US"/>
           </a:p>
@@ -1586,7 +1601,7 @@
           <a:p>
             <a:fld id="{DFE30287-765A-4AB0-BB96-53FA911AEAD1}" type="datetimeFigureOut">
               <a:rPr lang="en-US" smtClean="0"/>
-              <a:t>6/20/2020</a:t>
+              <a:t>6/25/2020</a:t>
             </a:fld>
             <a:endParaRPr lang="en-US"/>
           </a:p>
@@ -1784,7 +1799,7 @@
           <a:p>
             <a:fld id="{DFE30287-765A-4AB0-BB96-53FA911AEAD1}" type="datetimeFigureOut">
               <a:rPr lang="en-US" smtClean="0"/>
-              <a:t>6/20/2020</a:t>
+              <a:t>6/25/2020</a:t>
             </a:fld>
             <a:endParaRPr lang="en-US"/>
           </a:p>
@@ -2059,7 +2074,7 @@
           <a:p>
             <a:fld id="{DFE30287-765A-4AB0-BB96-53FA911AEAD1}" type="datetimeFigureOut">
               <a:rPr lang="en-US" smtClean="0"/>
-              <a:t>6/20/2020</a:t>
+              <a:t>6/25/2020</a:t>
             </a:fld>
             <a:endParaRPr lang="en-US"/>
           </a:p>
@@ -2324,7 +2339,7 @@
           <a:p>
             <a:fld id="{DFE30287-765A-4AB0-BB96-53FA911AEAD1}" type="datetimeFigureOut">
               <a:rPr lang="en-US" smtClean="0"/>
-              <a:t>6/20/2020</a:t>
+              <a:t>6/25/2020</a:t>
             </a:fld>
             <a:endParaRPr lang="en-US"/>
           </a:p>
@@ -2736,7 +2751,7 @@
           <a:p>
             <a:fld id="{DFE30287-765A-4AB0-BB96-53FA911AEAD1}" type="datetimeFigureOut">
               <a:rPr lang="en-US" smtClean="0"/>
-              <a:t>6/20/2020</a:t>
+              <a:t>6/25/2020</a:t>
             </a:fld>
             <a:endParaRPr lang="en-US"/>
           </a:p>
@@ -2877,7 +2892,7 @@
           <a:p>
             <a:fld id="{DFE30287-765A-4AB0-BB96-53FA911AEAD1}" type="datetimeFigureOut">
               <a:rPr lang="en-US" smtClean="0"/>
-              <a:t>6/20/2020</a:t>
+              <a:t>6/25/2020</a:t>
             </a:fld>
             <a:endParaRPr lang="en-US"/>
           </a:p>
@@ -2990,7 +3005,7 @@
           <a:p>
             <a:fld id="{DFE30287-765A-4AB0-BB96-53FA911AEAD1}" type="datetimeFigureOut">
               <a:rPr lang="en-US" smtClean="0"/>
-              <a:t>6/20/2020</a:t>
+              <a:t>6/25/2020</a:t>
             </a:fld>
             <a:endParaRPr lang="en-US"/>
           </a:p>
@@ -3301,7 +3316,7 @@
           <a:p>
             <a:fld id="{DFE30287-765A-4AB0-BB96-53FA911AEAD1}" type="datetimeFigureOut">
               <a:rPr lang="en-US" smtClean="0"/>
-              <a:t>6/20/2020</a:t>
+              <a:t>6/25/2020</a:t>
             </a:fld>
             <a:endParaRPr lang="en-US"/>
           </a:p>
@@ -3589,7 +3604,7 @@
           <a:p>
             <a:fld id="{DFE30287-765A-4AB0-BB96-53FA911AEAD1}" type="datetimeFigureOut">
               <a:rPr lang="en-US" smtClean="0"/>
-              <a:t>6/20/2020</a:t>
+              <a:t>6/25/2020</a:t>
             </a:fld>
             <a:endParaRPr lang="en-US"/>
           </a:p>
@@ -3830,7 +3845,7 @@
           <a:p>
             <a:fld id="{DFE30287-765A-4AB0-BB96-53FA911AEAD1}" type="datetimeFigureOut">
               <a:rPr lang="en-US" smtClean="0"/>
-              <a:t>6/20/2020</a:t>
+              <a:t>6/25/2020</a:t>
             </a:fld>
             <a:endParaRPr lang="en-US"/>
           </a:p>

</xml_diff>